<commit_message>
Put CSVs into CSV_file
</commit_message>
<xml_diff>
--- a/Project 1.pptx
+++ b/Project 1.pptx
@@ -117,6 +117,11 @@
       </a:defRPr>
     </a:lvl9pPr>
   </p:defaultTextStyle>
+  <p:extLst>
+    <p:ext uri="{EFAFB233-063F-42B5-8137-9DF3F51BA10A}">
+      <p15:sldGuideLst xmlns:p15="http://schemas.microsoft.com/office/powerpoint/2012/main"/>
+    </p:ext>
+  </p:extLst>
 </p:presentation>
 </file>
 
@@ -5913,6 +5918,9 @@
           <a:p>
             <a:endParaRPr lang="en-US" sz="2000" dirty="0"/>
           </a:p>
+          <a:p>
+            <a:endParaRPr lang="en-US" sz="2000" dirty="0"/>
+          </a:p>
         </p:txBody>
       </p:sp>
     </p:spTree>

</xml_diff>